<commit_message>
Deploy hytechcamps/building-webpages to github.com/hytechcamps/building-webpages.git:gh-pages
</commit_message>
<xml_diff>
--- a/HelloHtml.pptx
+++ b/HelloHtml.pptx
@@ -216,7 +216,7 @@
           <a:p>
             <a:fld id="{19104133-B5B0-4351-8158-4F0E5EB1E2BF}" type="datetimeFigureOut">
               <a:rPr lang="en-US" smtClean="0"/>
-              <a:t>4/29/2021</a:t>
+              <a:t>5/14/2021</a:t>
             </a:fld>
             <a:endParaRPr lang="en-US"/>
           </a:p>
@@ -1390,7 +1390,7 @@
             <a:fld id="{1C2D31DE-C454-491C-B5C3-F097855E3DF7}" type="datetime4">
               <a:rPr lang="en-US" smtClean="0"/>
               <a:pPr/>
-              <a:t>April 29, 2021</a:t>
+              <a:t>May 14, 2021</a:t>
             </a:fld>
             <a:endParaRPr lang="en-US" dirty="0"/>
           </a:p>
@@ -4782,7 +4782,7 @@
           <a:p>
             <a:fld id="{5958763E-B898-436D-883D-03711491D54A}" type="datetimeFigureOut">
               <a:rPr lang="en-US" smtClean="0"/>
-              <a:t>4/29/2021</a:t>
+              <a:t>5/14/2021</a:t>
             </a:fld>
             <a:endParaRPr lang="en-US"/>
           </a:p>
@@ -4975,7 +4975,7 @@
           <a:p>
             <a:fld id="{5958763E-B898-436D-883D-03711491D54A}" type="datetimeFigureOut">
               <a:rPr lang="en-US" smtClean="0"/>
-              <a:t>4/29/2021</a:t>
+              <a:t>5/14/2021</a:t>
             </a:fld>
             <a:endParaRPr lang="en-US"/>
           </a:p>
@@ -5225,7 +5225,7 @@
           <a:p>
             <a:fld id="{5958763E-B898-436D-883D-03711491D54A}" type="datetimeFigureOut">
               <a:rPr lang="en-US" smtClean="0"/>
-              <a:t>4/29/2021</a:t>
+              <a:t>5/14/2021</a:t>
             </a:fld>
             <a:endParaRPr lang="en-US"/>
           </a:p>
@@ -5573,7 +5573,7 @@
           <a:p>
             <a:fld id="{5958763E-B898-436D-883D-03711491D54A}" type="datetimeFigureOut">
               <a:rPr lang="en-US" smtClean="0"/>
-              <a:t>4/29/2021</a:t>
+              <a:t>5/14/2021</a:t>
             </a:fld>
             <a:endParaRPr lang="en-US"/>
           </a:p>
@@ -5989,7 +5989,7 @@
           <a:p>
             <a:fld id="{5958763E-B898-436D-883D-03711491D54A}" type="datetimeFigureOut">
               <a:rPr lang="en-US" smtClean="0"/>
-              <a:t>4/29/2021</a:t>
+              <a:t>5/14/2021</a:t>
             </a:fld>
             <a:endParaRPr lang="en-US"/>
           </a:p>
@@ -6490,7 +6490,7 @@
           <a:p>
             <a:fld id="{5958763E-B898-436D-883D-03711491D54A}" type="datetimeFigureOut">
               <a:rPr lang="en-US" smtClean="0"/>
-              <a:t>4/29/2021</a:t>
+              <a:t>5/14/2021</a:t>
             </a:fld>
             <a:endParaRPr lang="en-US"/>
           </a:p>
@@ -6941,7 +6941,7 @@
           <a:p>
             <a:fld id="{5958763E-B898-436D-883D-03711491D54A}" type="datetimeFigureOut">
               <a:rPr lang="en-US" smtClean="0"/>
-              <a:t>4/29/2021</a:t>
+              <a:t>5/14/2021</a:t>
             </a:fld>
             <a:endParaRPr lang="en-US"/>
           </a:p>
@@ -7552,7 +7552,7 @@
           <a:p>
             <a:fld id="{5958763E-B898-436D-883D-03711491D54A}" type="datetimeFigureOut">
               <a:rPr lang="en-US" smtClean="0"/>
-              <a:t>4/29/2021</a:t>
+              <a:t>5/14/2021</a:t>
             </a:fld>
             <a:endParaRPr lang="en-US"/>
           </a:p>
@@ -8323,7 +8323,7 @@
           <a:p>
             <a:fld id="{5958763E-B898-436D-883D-03711491D54A}" type="datetimeFigureOut">
               <a:rPr lang="en-US" smtClean="0"/>
-              <a:t>4/29/2021</a:t>
+              <a:t>5/14/2021</a:t>
             </a:fld>
             <a:endParaRPr lang="en-US"/>
           </a:p>
@@ -8427,7 +8427,7 @@
           <a:p>
             <a:fld id="{5958763E-B898-436D-883D-03711491D54A}" type="datetimeFigureOut">
               <a:rPr lang="en-US" smtClean="0"/>
-              <a:t>4/29/2021</a:t>
+              <a:t>5/14/2021</a:t>
             </a:fld>
             <a:endParaRPr lang="en-US"/>
           </a:p>
@@ -8754,7 +8754,7 @@
             <a:fld id="{1C2D31DE-C454-491C-B5C3-F097855E3DF7}" type="datetime4">
               <a:rPr lang="en-US" smtClean="0"/>
               <a:pPr/>
-              <a:t>April 29, 2021</a:t>
+              <a:t>May 14, 2021</a:t>
             </a:fld>
             <a:endParaRPr lang="en-US" dirty="0"/>
           </a:p>
@@ -11906,7 +11906,7 @@
           <a:p>
             <a:fld id="{5958763E-B898-436D-883D-03711491D54A}" type="datetimeFigureOut">
               <a:rPr lang="en-US" smtClean="0"/>
-              <a:t>4/29/2021</a:t>
+              <a:t>5/14/2021</a:t>
             </a:fld>
             <a:endParaRPr lang="en-US"/>
           </a:p>
@@ -12030,7 +12030,7 @@
           <a:p>
             <a:fld id="{5958763E-B898-436D-883D-03711491D54A}" type="datetimeFigureOut">
               <a:rPr lang="en-US" smtClean="0"/>
-              <a:t>4/29/2021</a:t>
+              <a:t>5/14/2021</a:t>
             </a:fld>
             <a:endParaRPr lang="en-US"/>
           </a:p>
@@ -12154,7 +12154,7 @@
           <a:p>
             <a:fld id="{5958763E-B898-436D-883D-03711491D54A}" type="datetimeFigureOut">
               <a:rPr lang="en-US" smtClean="0"/>
-              <a:t>4/29/2021</a:t>
+              <a:t>5/14/2021</a:t>
             </a:fld>
             <a:endParaRPr lang="en-US"/>
           </a:p>
@@ -12278,7 +12278,7 @@
           <a:p>
             <a:fld id="{5958763E-B898-436D-883D-03711491D54A}" type="datetimeFigureOut">
               <a:rPr lang="en-US" smtClean="0"/>
-              <a:t>4/29/2021</a:t>
+              <a:t>5/14/2021</a:t>
             </a:fld>
             <a:endParaRPr lang="en-US"/>
           </a:p>
@@ -12402,7 +12402,7 @@
           <a:p>
             <a:fld id="{5958763E-B898-436D-883D-03711491D54A}" type="datetimeFigureOut">
               <a:rPr lang="en-US" smtClean="0"/>
-              <a:t>4/29/2021</a:t>
+              <a:t>5/14/2021</a:t>
             </a:fld>
             <a:endParaRPr lang="en-US"/>
           </a:p>
@@ -12526,7 +12526,7 @@
           <a:p>
             <a:fld id="{5958763E-B898-436D-883D-03711491D54A}" type="datetimeFigureOut">
               <a:rPr lang="en-US" smtClean="0"/>
-              <a:t>4/29/2021</a:t>
+              <a:t>5/14/2021</a:t>
             </a:fld>
             <a:endParaRPr lang="en-US"/>
           </a:p>
@@ -12650,7 +12650,7 @@
           <a:p>
             <a:fld id="{5958763E-B898-436D-883D-03711491D54A}" type="datetimeFigureOut">
               <a:rPr lang="en-US" smtClean="0"/>
-              <a:t>4/29/2021</a:t>
+              <a:t>5/14/2021</a:t>
             </a:fld>
             <a:endParaRPr lang="en-US"/>
           </a:p>
@@ -12774,7 +12774,7 @@
           <a:p>
             <a:fld id="{5958763E-B898-436D-883D-03711491D54A}" type="datetimeFigureOut">
               <a:rPr lang="en-US" smtClean="0"/>
-              <a:t>4/29/2021</a:t>
+              <a:t>5/14/2021</a:t>
             </a:fld>
             <a:endParaRPr lang="en-US"/>
           </a:p>
@@ -12907,7 +12907,7 @@
           <a:p>
             <a:fld id="{5958763E-B898-436D-883D-03711491D54A}" type="datetimeFigureOut">
               <a:rPr lang="en-US" smtClean="0"/>
-              <a:t>4/29/2021</a:t>
+              <a:t>5/14/2021</a:t>
             </a:fld>
             <a:endParaRPr lang="en-US"/>
           </a:p>
@@ -16246,7 +16246,7 @@
             <a:fld id="{1C2D31DE-C454-491C-B5C3-F097855E3DF7}" type="datetime4">
               <a:rPr lang="en-US" smtClean="0"/>
               <a:pPr/>
-              <a:t>April 29, 2021</a:t>
+              <a:t>May 14, 2021</a:t>
             </a:fld>
             <a:endParaRPr lang="en-US" dirty="0"/>
           </a:p>
@@ -28482,7 +28482,7 @@
           <a:p>
             <a:fld id="{5958763E-B898-436D-883D-03711491D54A}" type="datetimeFigureOut">
               <a:rPr lang="en-US" smtClean="0"/>
-              <a:t>4/29/2021</a:t>
+              <a:t>5/14/2021</a:t>
             </a:fld>
             <a:endParaRPr lang="en-US"/>
           </a:p>
@@ -28884,7 +28884,7 @@
           <a:p>
             <a:fld id="{5958763E-B898-436D-883D-03711491D54A}" type="datetimeFigureOut">
               <a:rPr lang="en-US" smtClean="0"/>
-              <a:t>4/29/2021</a:t>
+              <a:t>5/14/2021</a:t>
             </a:fld>
             <a:endParaRPr lang="en-US"/>
           </a:p>
@@ -29178,7 +29178,7 @@
           <a:p>
             <a:fld id="{5958763E-B898-436D-883D-03711491D54A}" type="datetimeFigureOut">
               <a:rPr lang="en-US" smtClean="0"/>
-              <a:t>4/29/2021</a:t>
+              <a:t>5/14/2021</a:t>
             </a:fld>
             <a:endParaRPr lang="en-US"/>
           </a:p>
@@ -29379,7 +29379,7 @@
           <a:p>
             <a:fld id="{5958763E-B898-436D-883D-03711491D54A}" type="datetimeFigureOut">
               <a:rPr lang="en-US" smtClean="0"/>
-              <a:t>4/29/2021</a:t>
+              <a:t>5/14/2021</a:t>
             </a:fld>
             <a:endParaRPr lang="en-US"/>
           </a:p>
@@ -29640,7 +29640,7 @@
           <a:p>
             <a:fld id="{5958763E-B898-436D-883D-03711491D54A}" type="datetimeFigureOut">
               <a:rPr lang="en-US" smtClean="0"/>
-              <a:t>4/29/2021</a:t>
+              <a:t>5/14/2021</a:t>
             </a:fld>
             <a:endParaRPr lang="en-US"/>
           </a:p>
@@ -30148,7 +30148,7 @@
           <a:p>
             <a:fld id="{5958763E-B898-436D-883D-03711491D54A}" type="datetimeFigureOut">
               <a:rPr lang="en-US" smtClean="0"/>
-              <a:t>4/29/2021</a:t>
+              <a:t>5/14/2021</a:t>
             </a:fld>
             <a:endParaRPr lang="en-US"/>
           </a:p>
@@ -30627,7 +30627,7 @@
           <a:p>
             <a:fld id="{5958763E-B898-436D-883D-03711491D54A}" type="datetimeFigureOut">
               <a:rPr lang="en-US" smtClean="0"/>
-              <a:t>4/29/2021</a:t>
+              <a:t>5/14/2021</a:t>
             </a:fld>
             <a:endParaRPr lang="en-US"/>
           </a:p>
@@ -31446,7 +31446,7 @@
           <a:p>
             <a:fld id="{5958763E-B898-436D-883D-03711491D54A}" type="datetimeFigureOut">
               <a:rPr lang="en-US" smtClean="0"/>
-              <a:t>4/29/2021</a:t>
+              <a:t>5/14/2021</a:t>
             </a:fld>
             <a:endParaRPr lang="en-US"/>
           </a:p>
@@ -31647,7 +31647,7 @@
           <a:p>
             <a:fld id="{5958763E-B898-436D-883D-03711491D54A}" type="datetimeFigureOut">
               <a:rPr lang="en-US" smtClean="0"/>
-              <a:t>4/29/2021</a:t>
+              <a:t>5/14/2021</a:t>
             </a:fld>
             <a:endParaRPr lang="en-US"/>
           </a:p>
@@ -31982,7 +31982,7 @@
           <a:p>
             <a:fld id="{5958763E-B898-436D-883D-03711491D54A}" type="datetimeFigureOut">
               <a:rPr lang="en-US" smtClean="0"/>
-              <a:t>4/29/2021</a:t>
+              <a:t>5/14/2021</a:t>
             </a:fld>
             <a:endParaRPr lang="en-US"/>
           </a:p>
@@ -32212,7 +32212,7 @@
           <a:p>
             <a:fld id="{5958763E-B898-436D-883D-03711491D54A}" type="datetimeFigureOut">
               <a:rPr lang="en-US" smtClean="0"/>
-              <a:t>4/29/2021</a:t>
+              <a:t>5/14/2021</a:t>
             </a:fld>
             <a:endParaRPr lang="en-US"/>
           </a:p>
@@ -32456,7 +32456,7 @@
           <a:p>
             <a:fld id="{5958763E-B898-436D-883D-03711491D54A}" type="datetimeFigureOut">
               <a:rPr lang="en-US" smtClean="0"/>
-              <a:t>4/29/2021</a:t>
+              <a:t>5/14/2021</a:t>
             </a:fld>
             <a:endParaRPr lang="en-US"/>
           </a:p>
@@ -38519,6 +38519,45 @@
           <a:lstStyle/>
           <a:p>
             <a:r>
+              <a:rPr lang="en-US" sz="3500" b="1" dirty="0" err="1"/>
+              <a:t>H</a:t>
+            </a:r>
+            <a:r>
+              <a:rPr lang="en-US" sz="3500" dirty="0" err="1"/>
+              <a:t>yper</a:t>
+            </a:r>
+            <a:r>
+              <a:rPr lang="en-US" sz="3500" b="1" dirty="0" err="1"/>
+              <a:t>T</a:t>
+            </a:r>
+            <a:r>
+              <a:rPr lang="en-US" sz="3500" dirty="0" err="1"/>
+              <a:t>ext</a:t>
+            </a:r>
+            <a:r>
+              <a:rPr lang="en-US" sz="3500" dirty="0"/>
+              <a:t> </a:t>
+            </a:r>
+            <a:r>
+              <a:rPr lang="en-US" sz="3500" b="1"/>
+              <a:t>M</a:t>
+            </a:r>
+            <a:r>
+              <a:rPr lang="en-US" sz="3500"/>
+              <a:t>arkup </a:t>
+            </a:r>
+            <a:r>
+              <a:rPr lang="en-US" sz="3500" b="1"/>
+              <a:t>L</a:t>
+            </a:r>
+            <a:r>
+              <a:rPr lang="en-US" sz="3500"/>
+              <a:t>anguage</a:t>
+            </a:r>
+            <a:endParaRPr lang="en-US" sz="3500" b="1"/>
+          </a:p>
+          <a:p>
+            <a:r>
               <a:rPr lang="en-US" sz="3500" dirty="0"/>
               <a:t>An </a:t>
             </a:r>
@@ -38561,12 +38600,6 @@
               <a:rPr lang="en-US" sz="3000" dirty="0"/>
               <a:t>)</a:t>
             </a:r>
-          </a:p>
-          <a:p>
-            <a:pPr marL="457200" lvl="1" indent="0">
-              <a:buNone/>
-            </a:pPr>
-            <a:endParaRPr lang="en-US" sz="3000" dirty="0"/>
           </a:p>
           <a:p>
             <a:r>
@@ -38724,15 +38757,33 @@
                                   </p:childTnLst>
                                 </p:cTn>
                               </p:par>
+                            </p:childTnLst>
+                          </p:cTn>
+                        </p:par>
+                      </p:childTnLst>
+                    </p:cTn>
+                  </p:par>
+                  <p:par>
+                    <p:cTn id="8" fill="hold">
+                      <p:stCondLst>
+                        <p:cond delay="indefinite"/>
+                      </p:stCondLst>
+                      <p:childTnLst>
+                        <p:par>
+                          <p:cTn id="9" fill="hold">
+                            <p:stCondLst>
+                              <p:cond delay="0"/>
+                            </p:stCondLst>
+                            <p:childTnLst>
                               <p:par>
-                                <p:cTn id="8" presetID="10" presetClass="entr" presetSubtype="0" fill="hold" grpId="0" nodeType="withEffect">
+                                <p:cTn id="10" presetID="10" presetClass="entr" presetSubtype="0" fill="hold" grpId="0" nodeType="clickEffect">
                                   <p:stCondLst>
                                     <p:cond delay="0"/>
                                   </p:stCondLst>
                                   <p:childTnLst>
                                     <p:set>
                                       <p:cBhvr>
-                                        <p:cTn id="9" dur="1" fill="hold">
+                                        <p:cTn id="11" dur="1" fill="hold">
                                           <p:stCondLst>
                                             <p:cond delay="0"/>
                                           </p:stCondLst>
@@ -38754,11 +38805,54 @@
                                     </p:set>
                                     <p:animEffect transition="in" filter="fade">
                                       <p:cBhvr>
-                                        <p:cTn id="10" dur="500"/>
+                                        <p:cTn id="12" dur="500"/>
                                         <p:tgtEl>
                                           <p:spTgt spid="3">
                                             <p:txEl>
                                               <p:pRg st="1" end="1"/>
+                                            </p:txEl>
+                                          </p:spTgt>
+                                        </p:tgtEl>
+                                      </p:cBhvr>
+                                    </p:animEffect>
+                                  </p:childTnLst>
+                                </p:cTn>
+                              </p:par>
+                              <p:par>
+                                <p:cTn id="13" presetID="10" presetClass="entr" presetSubtype="0" fill="hold" grpId="0" nodeType="withEffect">
+                                  <p:stCondLst>
+                                    <p:cond delay="0"/>
+                                  </p:stCondLst>
+                                  <p:childTnLst>
+                                    <p:set>
+                                      <p:cBhvr>
+                                        <p:cTn id="14" dur="1" fill="hold">
+                                          <p:stCondLst>
+                                            <p:cond delay="0"/>
+                                          </p:stCondLst>
+                                        </p:cTn>
+                                        <p:tgtEl>
+                                          <p:spTgt spid="3">
+                                            <p:txEl>
+                                              <p:pRg st="2" end="2"/>
+                                            </p:txEl>
+                                          </p:spTgt>
+                                        </p:tgtEl>
+                                        <p:attrNameLst>
+                                          <p:attrName>style.visibility</p:attrName>
+                                        </p:attrNameLst>
+                                      </p:cBhvr>
+                                      <p:to>
+                                        <p:strVal val="visible"/>
+                                      </p:to>
+                                    </p:set>
+                                    <p:animEffect transition="in" filter="fade">
+                                      <p:cBhvr>
+                                        <p:cTn id="15" dur="500"/>
+                                        <p:tgtEl>
+                                          <p:spTgt spid="3">
+                                            <p:txEl>
+                                              <p:pRg st="2" end="2"/>
                                             </p:txEl>
                                           </p:spTgt>
                                         </p:tgtEl>
@@ -38774,26 +38868,26 @@
                     </p:cTn>
                   </p:par>
                   <p:par>
-                    <p:cTn id="11" fill="hold">
+                    <p:cTn id="16" fill="hold">
                       <p:stCondLst>
                         <p:cond delay="indefinite"/>
                       </p:stCondLst>
                       <p:childTnLst>
                         <p:par>
-                          <p:cTn id="12" fill="hold">
+                          <p:cTn id="17" fill="hold">
                             <p:stCondLst>
                               <p:cond delay="0"/>
                             </p:stCondLst>
                             <p:childTnLst>
                               <p:par>
-                                <p:cTn id="13" presetID="10" presetClass="entr" presetSubtype="0" fill="hold" grpId="0" nodeType="clickEffect">
+                                <p:cTn id="18" presetID="10" presetClass="entr" presetSubtype="0" fill="hold" grpId="0" nodeType="clickEffect">
                                   <p:stCondLst>
                                     <p:cond delay="0"/>
                                   </p:stCondLst>
                                   <p:childTnLst>
                                     <p:set>
                                       <p:cBhvr>
-                                        <p:cTn id="14" dur="1" fill="hold">
+                                        <p:cTn id="19" dur="1" fill="hold">
                                           <p:stCondLst>
                                             <p:cond delay="0"/>
                                           </p:stCondLst>
@@ -38815,7 +38909,7 @@
                                     </p:set>
                                     <p:animEffect transition="in" filter="fade">
                                       <p:cBhvr>
-                                        <p:cTn id="15" dur="500"/>
+                                        <p:cTn id="20" dur="500"/>
                                         <p:tgtEl>
                                           <p:spTgt spid="3">
                                             <p:txEl>
@@ -38829,14 +38923,14 @@
                                 </p:cTn>
                               </p:par>
                               <p:par>
-                                <p:cTn id="16" presetID="10" presetClass="entr" presetSubtype="0" fill="hold" grpId="0" nodeType="withEffect">
+                                <p:cTn id="21" presetID="10" presetClass="entr" presetSubtype="0" fill="hold" grpId="0" nodeType="withEffect">
                                   <p:stCondLst>
                                     <p:cond delay="0"/>
                                   </p:stCondLst>
                                   <p:childTnLst>
                                     <p:set>
                                       <p:cBhvr>
-                                        <p:cTn id="17" dur="1" fill="hold">
+                                        <p:cTn id="22" dur="1" fill="hold">
                                           <p:stCondLst>
                                             <p:cond delay="0"/>
                                           </p:stCondLst>
@@ -38858,7 +38952,7 @@
                                     </p:set>
                                     <p:animEffect transition="in" filter="fade">
                                       <p:cBhvr>
-                                        <p:cTn id="18" dur="500"/>
+                                        <p:cTn id="23" dur="500"/>
                                         <p:tgtEl>
                                           <p:spTgt spid="3">
                                             <p:txEl>
@@ -38872,14 +38966,14 @@
                                 </p:cTn>
                               </p:par>
                               <p:par>
-                                <p:cTn id="19" presetID="10" presetClass="entr" presetSubtype="0" fill="hold" nodeType="withEffect">
+                                <p:cTn id="24" presetID="10" presetClass="entr" presetSubtype="0" fill="hold" nodeType="withEffect">
                                   <p:stCondLst>
                                     <p:cond delay="0"/>
                                   </p:stCondLst>
                                   <p:childTnLst>
                                     <p:set>
                                       <p:cBhvr>
-                                        <p:cTn id="20" dur="1" fill="hold">
+                                        <p:cTn id="25" dur="1" fill="hold">
                                           <p:stCondLst>
                                             <p:cond delay="0"/>
                                           </p:stCondLst>
@@ -38897,7 +38991,7 @@
                                     </p:set>
                                     <p:animEffect transition="in" filter="fade">
                                       <p:cBhvr>
-                                        <p:cTn id="21" dur="500"/>
+                                        <p:cTn id="26" dur="500"/>
                                         <p:tgtEl>
                                           <p:spTgt spid="2052"/>
                                         </p:tgtEl>

</xml_diff>